<commit_message>
final commit at bay piggies
</commit_message>
<xml_diff>
--- a/Bay_Piggies_2025_06_26.pptx
+++ b/Bay_Piggies_2025_06_26.pptx
@@ -308,7 +308,7 @@
   <pc:docChgLst>
     <pc:chgData name="Michael Purtell" userId="acb440cf5b4acec9" providerId="LiveId" clId="{C8572EB0-8950-433A-BC3D-552043CBFF01}"/>
     <pc:docChg chg="undo custSel addSld delSld modSld">
-      <pc:chgData name="Michael Purtell" userId="acb440cf5b4acec9" providerId="LiveId" clId="{C8572EB0-8950-433A-BC3D-552043CBFF01}" dt="2025-06-26T18:26:34.904" v="1727" actId="1076"/>
+      <pc:chgData name="Michael Purtell" userId="acb440cf5b4acec9" providerId="LiveId" clId="{C8572EB0-8950-433A-BC3D-552043CBFF01}" dt="2025-06-27T02:29:40.900" v="1875" actId="255"/>
       <pc:docMkLst>
         <pc:docMk/>
       </pc:docMkLst>
@@ -385,13 +385,13 @@
         </pc:sldMkLst>
       </pc:sldChg>
       <pc:sldChg chg="addSp modSp mod modNotes">
-        <pc:chgData name="Michael Purtell" userId="acb440cf5b4acec9" providerId="LiveId" clId="{C8572EB0-8950-433A-BC3D-552043CBFF01}" dt="2025-06-23T17:04:04.785" v="1277" actId="1076"/>
+        <pc:chgData name="Michael Purtell" userId="acb440cf5b4acec9" providerId="LiveId" clId="{C8572EB0-8950-433A-BC3D-552043CBFF01}" dt="2025-06-27T02:05:10.272" v="1874" actId="20577"/>
         <pc:sldMkLst>
           <pc:docMk/>
           <pc:sldMk cId="0" sldId="264"/>
         </pc:sldMkLst>
         <pc:spChg chg="mod">
-          <ac:chgData name="Michael Purtell" userId="acb440cf5b4acec9" providerId="LiveId" clId="{C8572EB0-8950-433A-BC3D-552043CBFF01}" dt="2025-06-23T17:03:34.558" v="1272" actId="20577"/>
+          <ac:chgData name="Michael Purtell" userId="acb440cf5b4acec9" providerId="LiveId" clId="{C8572EB0-8950-433A-BC3D-552043CBFF01}" dt="2025-06-27T02:05:10.272" v="1874" actId="20577"/>
           <ac:spMkLst>
             <pc:docMk/>
             <pc:sldMk cId="0" sldId="264"/>
@@ -407,7 +407,7 @@
           </ac:picMkLst>
         </pc:picChg>
         <pc:picChg chg="mod">
-          <ac:chgData name="Michael Purtell" userId="acb440cf5b4acec9" providerId="LiveId" clId="{C8572EB0-8950-433A-BC3D-552043CBFF01}" dt="2025-06-23T17:02:10.466" v="1178" actId="14100"/>
+          <ac:chgData name="Michael Purtell" userId="acb440cf5b4acec9" providerId="LiveId" clId="{C8572EB0-8950-433A-BC3D-552043CBFF01}" dt="2025-06-27T02:04:23.261" v="1751" actId="1076"/>
           <ac:picMkLst>
             <pc:docMk/>
             <pc:sldMk cId="0" sldId="264"/>
@@ -444,14 +444,6 @@
           <pc:docMk/>
           <pc:sldMk cId="0" sldId="266"/>
         </pc:sldMkLst>
-        <pc:spChg chg="mod">
-          <ac:chgData name="Michael Purtell" userId="acb440cf5b4acec9" providerId="LiveId" clId="{C8572EB0-8950-433A-BC3D-552043CBFF01}" dt="2025-06-23T16:42:35.639" v="885" actId="20577"/>
-          <ac:spMkLst>
-            <pc:docMk/>
-            <pc:sldMk cId="0" sldId="266"/>
-            <ac:spMk id="353" creationId="{00000000-0000-0000-0000-000000000000}"/>
-          </ac:spMkLst>
-        </pc:spChg>
       </pc:sldChg>
       <pc:sldChg chg="modNotes">
         <pc:chgData name="Michael Purtell" userId="acb440cf5b4acec9" providerId="LiveId" clId="{C8572EB0-8950-433A-BC3D-552043CBFF01}" dt="2025-06-23T16:38:16.925" v="224"/>
@@ -634,7 +626,7 @@
         </pc:spChg>
       </pc:sldChg>
       <pc:sldChg chg="addSp delSp modSp add mod">
-        <pc:chgData name="Michael Purtell" userId="acb440cf5b4acec9" providerId="LiveId" clId="{C8572EB0-8950-433A-BC3D-552043CBFF01}" dt="2025-06-26T18:26:34.904" v="1727" actId="1076"/>
+        <pc:chgData name="Michael Purtell" userId="acb440cf5b4acec9" providerId="LiveId" clId="{C8572EB0-8950-433A-BC3D-552043CBFF01}" dt="2025-06-27T02:29:40.900" v="1875" actId="255"/>
         <pc:sldMkLst>
           <pc:docMk/>
           <pc:sldMk cId="1489871014" sldId="288"/>
@@ -648,7 +640,7 @@
           </ac:spMkLst>
         </pc:spChg>
         <pc:spChg chg="add mod">
-          <ac:chgData name="Michael Purtell" userId="acb440cf5b4acec9" providerId="LiveId" clId="{C8572EB0-8950-433A-BC3D-552043CBFF01}" dt="2025-06-26T18:22:53.880" v="1648" actId="20577"/>
+          <ac:chgData name="Michael Purtell" userId="acb440cf5b4acec9" providerId="LiveId" clId="{C8572EB0-8950-433A-BC3D-552043CBFF01}" dt="2025-06-27T02:29:40.900" v="1875" actId="255"/>
           <ac:spMkLst>
             <pc:docMk/>
             <pc:sldMk cId="1489871014" sldId="288"/>
@@ -17505,7 +17497,7 @@
         </p:nvSpPr>
         <p:spPr>
           <a:xfrm>
-            <a:off x="1639358" y="1149637"/>
+            <a:off x="2092123" y="1140660"/>
             <a:ext cx="3179700" cy="3390900"/>
           </a:xfrm>
           <a:prstGeom prst="rect">
@@ -17547,23 +17539,6 @@
               <a:rPr lang="en" dirty="0"/>
               <a:t>Shows operating range on X-Y grid</a:t>
             </a:r>
-            <a:endParaRPr dirty="0"/>
-          </a:p>
-          <a:p>
-            <a:pPr marL="0" lvl="0" indent="0" algn="l" rtl="0">
-              <a:spcBef>
-                <a:spcPts val="1200"/>
-              </a:spcBef>
-              <a:spcAft>
-                <a:spcPts val="0"/>
-              </a:spcAft>
-              <a:buNone/>
-            </a:pPr>
-            <a:r>
-              <a:rPr lang="en" dirty="0"/>
-              <a:t>Inventor unknown</a:t>
-            </a:r>
-            <a:endParaRPr dirty="0"/>
           </a:p>
           <a:p>
             <a:pPr marL="0" lvl="0" indent="0" algn="l" rtl="0">
@@ -17593,9 +17568,23 @@
             </a:pPr>
             <a:r>
               <a:rPr lang="en" dirty="0"/>
-              <a:t>What would you call this plot if the term Shmoo had not been coined?</a:t>
+              <a:t>What would you call this plot?</a:t>
             </a:r>
-            <a:endParaRPr dirty="0"/>
+          </a:p>
+          <a:p>
+            <a:pPr marL="0" lvl="0" indent="0" algn="l" rtl="0">
+              <a:spcBef>
+                <a:spcPts val="1200"/>
+              </a:spcBef>
+              <a:spcAft>
+                <a:spcPts val="1200"/>
+              </a:spcAft>
+              <a:buNone/>
+            </a:pPr>
+            <a:r>
+              <a:rPr lang="en" dirty="0"/>
+              <a:t>Inventer unknown, earliest known user was Bob Huston</a:t>
+            </a:r>
           </a:p>
         </p:txBody>
       </p:sp>
@@ -17615,8 +17604,8 @@
         </p:blipFill>
         <p:spPr>
           <a:xfrm>
-            <a:off x="163313" y="1119188"/>
-            <a:ext cx="1140495" cy="1614959"/>
+            <a:off x="144254" y="2571750"/>
+            <a:ext cx="1671827" cy="2407783"/>
           </a:xfrm>
           <a:prstGeom prst="rect">
             <a:avLst/>
@@ -20428,7 +20417,7 @@
         <p:spPr>
           <a:xfrm>
             <a:off x="5024956" y="1622018"/>
-            <a:ext cx="3096285" cy="2246769"/>
+            <a:ext cx="3096285" cy="3385542"/>
           </a:xfrm>
           <a:prstGeom prst="rect">
             <a:avLst/>
@@ -20442,32 +20431,32 @@
           <a:lstStyle/>
           <a:p>
             <a:r>
-              <a:rPr lang="en-US" dirty="0"/>
+              <a:rPr lang="en-US" sz="1800" dirty="0"/>
               <a:t>Find me on LinkedIn by name</a:t>
             </a:r>
           </a:p>
           <a:p>
-            <a:endParaRPr lang="en-US" dirty="0"/>
+            <a:endParaRPr lang="en-US" sz="1800" dirty="0"/>
           </a:p>
           <a:p>
             <a:r>
-              <a:rPr lang="en-US" dirty="0"/>
+              <a:rPr lang="en-US" sz="1800" dirty="0"/>
               <a:t>Bluesky: </a:t>
             </a:r>
             <a:r>
-              <a:rPr lang="en-US" dirty="0" err="1">
+              <a:rPr lang="en-US" sz="1800" dirty="0" err="1">
                 <a:hlinkClick r:id="rId4"/>
               </a:rPr>
               <a:t>michaelpurtell@bsky.social</a:t>
             </a:r>
-            <a:endParaRPr lang="en-US" dirty="0"/>
+            <a:endParaRPr lang="en-US" sz="1800" dirty="0"/>
           </a:p>
           <a:p>
-            <a:endParaRPr lang="en-US" dirty="0"/>
+            <a:endParaRPr lang="en-US" sz="1800" dirty="0"/>
           </a:p>
           <a:p>
             <a:r>
-              <a:rPr lang="en-US" dirty="0"/>
+              <a:rPr lang="en-US" sz="1800" dirty="0"/>
               <a:t>Plotly Community/ Figure Friday</a:t>
             </a:r>
           </a:p>

</xml_diff>